<commit_message>
IKEv2 is modified and log files are added
</commit_message>
<xml_diff>
--- a/Network/IKEV2.pptx
+++ b/Network/IKEV2.pptx
@@ -5,7 +5,7 @@
     <p:sldMasterId id="2147483648" r:id="rId1"/>
   </p:sldMasterIdLst>
   <p:notesMasterIdLst>
-    <p:notesMasterId r:id="rId12"/>
+    <p:notesMasterId r:id="rId15"/>
   </p:notesMasterIdLst>
   <p:sldIdLst>
     <p:sldId id="256" r:id="rId2"/>
@@ -17,7 +17,10 @@
     <p:sldId id="262" r:id="rId8"/>
     <p:sldId id="263" r:id="rId9"/>
     <p:sldId id="264" r:id="rId10"/>
-    <p:sldId id="265" r:id="rId11"/>
+    <p:sldId id="266" r:id="rId11"/>
+    <p:sldId id="268" r:id="rId12"/>
+    <p:sldId id="265" r:id="rId13"/>
+    <p:sldId id="269" r:id="rId14"/>
   </p:sldIdLst>
   <p:sldSz cx="12192000" cy="6858000"/>
   <p:notesSz cx="6858000" cy="9144000"/>
@@ -116,6 +119,11 @@
       </a:defRPr>
     </a:lvl9pPr>
   </p:defaultTextStyle>
+  <p:extLst>
+    <p:ext uri="{EFAFB233-063F-42B5-8137-9DF3F51BA10A}">
+      <p15:sldGuideLst xmlns:p15="http://schemas.microsoft.com/office/powerpoint/2012/main"/>
+    </p:ext>
+  </p:extLst>
 </p:presentation>
 </file>
 
@@ -227,7 +235,7 @@
           <a:p>
             <a:fld id="{8E7260E1-1105-44E8-9C6F-0B8DDBF87D4F}" type="datetimeFigureOut">
               <a:rPr lang="tr-TR" smtClean="0"/>
-              <a:t>4.11.2022</a:t>
+              <a:t>9.11.2022</a:t>
             </a:fld>
             <a:endParaRPr lang="tr-TR"/>
           </a:p>
@@ -579,6 +587,90 @@
 </p:notes>
 </file>
 
+<file path=ppt/notesSlides/notesSlide2.xml><?xml version="1.0" encoding="utf-8"?>
+<p:notes xmlns:a="http://schemas.openxmlformats.org/drawingml/2006/main" xmlns:r="http://schemas.openxmlformats.org/officeDocument/2006/relationships" xmlns:p="http://schemas.openxmlformats.org/presentationml/2006/main">
+  <p:cSld>
+    <p:spTree>
+      <p:nvGrpSpPr>
+        <p:cNvPr id="1" name=""/>
+        <p:cNvGrpSpPr/>
+        <p:nvPr/>
+      </p:nvGrpSpPr>
+      <p:grpSpPr>
+        <a:xfrm>
+          <a:off x="0" y="0"/>
+          <a:ext cx="0" cy="0"/>
+          <a:chOff x="0" y="0"/>
+          <a:chExt cx="0" cy="0"/>
+        </a:xfrm>
+      </p:grpSpPr>
+      <p:sp>
+        <p:nvSpPr>
+          <p:cNvPr id="2" name="Slayt Görüntüsü Yer Tutucusu 1"/>
+          <p:cNvSpPr>
+            <a:spLocks noGrp="1" noRot="1" noChangeAspect="1"/>
+          </p:cNvSpPr>
+          <p:nvPr>
+            <p:ph type="sldImg"/>
+          </p:nvPr>
+        </p:nvSpPr>
+        <p:spPr/>
+      </p:sp>
+      <p:sp>
+        <p:nvSpPr>
+          <p:cNvPr id="3" name="Not Yer Tutucusu 2"/>
+          <p:cNvSpPr>
+            <a:spLocks noGrp="1"/>
+          </p:cNvSpPr>
+          <p:nvPr>
+            <p:ph type="body" idx="1"/>
+          </p:nvPr>
+        </p:nvSpPr>
+        <p:spPr/>
+        <p:txBody>
+          <a:bodyPr/>
+          <a:lstStyle/>
+          <a:p>
+            <a:endParaRPr lang="tr-TR" dirty="0"/>
+          </a:p>
+        </p:txBody>
+      </p:sp>
+      <p:sp>
+        <p:nvSpPr>
+          <p:cNvPr id="4" name="Slayt Numarası Yer Tutucusu 3"/>
+          <p:cNvSpPr>
+            <a:spLocks noGrp="1"/>
+          </p:cNvSpPr>
+          <p:nvPr>
+            <p:ph type="sldNum" sz="quarter" idx="10"/>
+          </p:nvPr>
+        </p:nvSpPr>
+        <p:spPr/>
+        <p:txBody>
+          <a:bodyPr/>
+          <a:lstStyle/>
+          <a:p>
+            <a:fld id="{D117C5B4-6722-4122-B857-28B5E3BD1361}" type="slidenum">
+              <a:rPr lang="tr-TR" smtClean="0"/>
+              <a:t>13</a:t>
+            </a:fld>
+            <a:endParaRPr lang="tr-TR"/>
+          </a:p>
+        </p:txBody>
+      </p:sp>
+    </p:spTree>
+    <p:extLst>
+      <p:ext uri="{BB962C8B-B14F-4D97-AF65-F5344CB8AC3E}">
+        <p14:creationId xmlns:p14="http://schemas.microsoft.com/office/powerpoint/2010/main" val="1006820661"/>
+      </p:ext>
+    </p:extLst>
+  </p:cSld>
+  <p:clrMapOvr>
+    <a:masterClrMapping/>
+  </p:clrMapOvr>
+</p:notes>
+</file>
+
 <file path=ppt/slideLayouts/slideLayout1.xml><?xml version="1.0" encoding="utf-8"?>
 <p:sldLayout xmlns:a="http://schemas.openxmlformats.org/drawingml/2006/main" xmlns:r="http://schemas.openxmlformats.org/officeDocument/2006/relationships" xmlns:p="http://schemas.openxmlformats.org/presentationml/2006/main" type="title" preserve="1">
   <p:cSld name="Başlık Slaydı">
@@ -710,7 +802,7 @@
           <a:p>
             <a:fld id="{27F1E290-D924-4CE2-AB5C-B202E0CEFA11}" type="datetimeFigureOut">
               <a:rPr lang="tr-TR" smtClean="0"/>
-              <a:t>4.11.2022</a:t>
+              <a:t>9.11.2022</a:t>
             </a:fld>
             <a:endParaRPr lang="tr-TR"/>
           </a:p>
@@ -880,7 +972,7 @@
           <a:p>
             <a:fld id="{27F1E290-D924-4CE2-AB5C-B202E0CEFA11}" type="datetimeFigureOut">
               <a:rPr lang="tr-TR" smtClean="0"/>
-              <a:t>4.11.2022</a:t>
+              <a:t>9.11.2022</a:t>
             </a:fld>
             <a:endParaRPr lang="tr-TR"/>
           </a:p>
@@ -1060,7 +1152,7 @@
           <a:p>
             <a:fld id="{27F1E290-D924-4CE2-AB5C-B202E0CEFA11}" type="datetimeFigureOut">
               <a:rPr lang="tr-TR" smtClean="0"/>
-              <a:t>4.11.2022</a:t>
+              <a:t>9.11.2022</a:t>
             </a:fld>
             <a:endParaRPr lang="tr-TR"/>
           </a:p>
@@ -1230,7 +1322,7 @@
           <a:p>
             <a:fld id="{27F1E290-D924-4CE2-AB5C-B202E0CEFA11}" type="datetimeFigureOut">
               <a:rPr lang="tr-TR" smtClean="0"/>
-              <a:t>4.11.2022</a:t>
+              <a:t>9.11.2022</a:t>
             </a:fld>
             <a:endParaRPr lang="tr-TR"/>
           </a:p>
@@ -1476,7 +1568,7 @@
           <a:p>
             <a:fld id="{27F1E290-D924-4CE2-AB5C-B202E0CEFA11}" type="datetimeFigureOut">
               <a:rPr lang="tr-TR" smtClean="0"/>
-              <a:t>4.11.2022</a:t>
+              <a:t>9.11.2022</a:t>
             </a:fld>
             <a:endParaRPr lang="tr-TR"/>
           </a:p>
@@ -1708,7 +1800,7 @@
           <a:p>
             <a:fld id="{27F1E290-D924-4CE2-AB5C-B202E0CEFA11}" type="datetimeFigureOut">
               <a:rPr lang="tr-TR" smtClean="0"/>
-              <a:t>4.11.2022</a:t>
+              <a:t>9.11.2022</a:t>
             </a:fld>
             <a:endParaRPr lang="tr-TR"/>
           </a:p>
@@ -2075,7 +2167,7 @@
           <a:p>
             <a:fld id="{27F1E290-D924-4CE2-AB5C-B202E0CEFA11}" type="datetimeFigureOut">
               <a:rPr lang="tr-TR" smtClean="0"/>
-              <a:t>4.11.2022</a:t>
+              <a:t>9.11.2022</a:t>
             </a:fld>
             <a:endParaRPr lang="tr-TR"/>
           </a:p>
@@ -2193,7 +2285,7 @@
           <a:p>
             <a:fld id="{27F1E290-D924-4CE2-AB5C-B202E0CEFA11}" type="datetimeFigureOut">
               <a:rPr lang="tr-TR" smtClean="0"/>
-              <a:t>4.11.2022</a:t>
+              <a:t>9.11.2022</a:t>
             </a:fld>
             <a:endParaRPr lang="tr-TR"/>
           </a:p>
@@ -2288,7 +2380,7 @@
           <a:p>
             <a:fld id="{27F1E290-D924-4CE2-AB5C-B202E0CEFA11}" type="datetimeFigureOut">
               <a:rPr lang="tr-TR" smtClean="0"/>
-              <a:t>4.11.2022</a:t>
+              <a:t>9.11.2022</a:t>
             </a:fld>
             <a:endParaRPr lang="tr-TR"/>
           </a:p>
@@ -2565,7 +2657,7 @@
           <a:p>
             <a:fld id="{27F1E290-D924-4CE2-AB5C-B202E0CEFA11}" type="datetimeFigureOut">
               <a:rPr lang="tr-TR" smtClean="0"/>
-              <a:t>4.11.2022</a:t>
+              <a:t>9.11.2022</a:t>
             </a:fld>
             <a:endParaRPr lang="tr-TR"/>
           </a:p>
@@ -2818,7 +2910,7 @@
           <a:p>
             <a:fld id="{27F1E290-D924-4CE2-AB5C-B202E0CEFA11}" type="datetimeFigureOut">
               <a:rPr lang="tr-TR" smtClean="0"/>
-              <a:t>4.11.2022</a:t>
+              <a:t>9.11.2022</a:t>
             </a:fld>
             <a:endParaRPr lang="tr-TR"/>
           </a:p>
@@ -3031,7 +3123,7 @@
           <a:p>
             <a:fld id="{27F1E290-D924-4CE2-AB5C-B202E0CEFA11}" type="datetimeFigureOut">
               <a:rPr lang="tr-TR" smtClean="0"/>
-              <a:t>4.11.2022</a:t>
+              <a:t>9.11.2022</a:t>
             </a:fld>
             <a:endParaRPr lang="tr-TR"/>
           </a:p>
@@ -3568,7 +3660,15 @@
           <a:p>
             <a:r>
               <a:rPr lang="en-GB" dirty="0" smtClean="0"/>
-              <a:t>Log/Code Analyse</a:t>
+              <a:t>Configuration (</a:t>
+            </a:r>
+            <a:r>
+              <a:rPr lang="en-GB" dirty="0" err="1" smtClean="0"/>
+              <a:t>ipsec.conf</a:t>
+            </a:r>
+            <a:r>
+              <a:rPr lang="en-GB" dirty="0" smtClean="0"/>
+              <a:t>)</a:t>
             </a:r>
             <a:endParaRPr lang="tr-TR" dirty="0"/>
           </a:p>
@@ -3584,19 +3684,1718 @@
             <p:ph idx="1"/>
           </p:nvPr>
         </p:nvSpPr>
+        <p:spPr>
+          <a:xfrm>
+            <a:off x="4486922" y="1690688"/>
+            <a:ext cx="7705078" cy="4351338"/>
+          </a:xfrm>
+        </p:spPr>
+        <p:txBody>
+          <a:bodyPr>
+            <a:normAutofit fontScale="25000" lnSpcReduction="20000"/>
+          </a:bodyPr>
+          <a:lstStyle/>
+          <a:p>
+            <a:pPr>
+              <a:buFont typeface="Wingdings" panose="05000000000000000000" pitchFamily="2" charset="2"/>
+              <a:buChar char="v"/>
+            </a:pPr>
+            <a:r>
+              <a:rPr lang="tr-TR" dirty="0" err="1"/>
+              <a:t>config</a:t>
+            </a:r>
+            <a:r>
+              <a:rPr lang="tr-TR" dirty="0"/>
+              <a:t> </a:t>
+            </a:r>
+            <a:r>
+              <a:rPr lang="tr-TR" dirty="0" err="1" smtClean="0"/>
+              <a:t>setup</a:t>
+            </a:r>
+            <a:endParaRPr lang="tr-TR" dirty="0"/>
+          </a:p>
+          <a:p>
+            <a:pPr marL="0" indent="0">
+              <a:buNone/>
+            </a:pPr>
+            <a:r>
+              <a:rPr lang="tr-TR" dirty="0"/>
+              <a:t>	</a:t>
+            </a:r>
+            <a:r>
+              <a:rPr lang="tr-TR" dirty="0" err="1"/>
+              <a:t>charondebug</a:t>
+            </a:r>
+            <a:r>
+              <a:rPr lang="tr-TR" dirty="0"/>
+              <a:t>=”</a:t>
+            </a:r>
+            <a:r>
+              <a:rPr lang="tr-TR" dirty="0" err="1"/>
+              <a:t>all</a:t>
+            </a:r>
+            <a:r>
+              <a:rPr lang="tr-TR" dirty="0" smtClean="0"/>
+              <a:t>”</a:t>
+            </a:r>
+            <a:endParaRPr lang="tr-TR" dirty="0"/>
+          </a:p>
+          <a:p>
+            <a:pPr marL="0" indent="0">
+              <a:buNone/>
+            </a:pPr>
+            <a:r>
+              <a:rPr lang="tr-TR" dirty="0"/>
+              <a:t>	</a:t>
+            </a:r>
+            <a:r>
+              <a:rPr lang="tr-TR" dirty="0" err="1" smtClean="0"/>
+              <a:t>uniqueids</a:t>
+            </a:r>
+            <a:r>
+              <a:rPr lang="tr-TR" dirty="0" smtClean="0"/>
+              <a:t>=</a:t>
+            </a:r>
+            <a:r>
+              <a:rPr lang="tr-TR" dirty="0" err="1" smtClean="0"/>
+              <a:t>yes</a:t>
+            </a:r>
+            <a:endParaRPr lang="tr-TR" dirty="0"/>
+          </a:p>
+          <a:p>
+            <a:pPr marL="0" indent="0">
+              <a:buNone/>
+            </a:pPr>
+            <a:r>
+              <a:rPr lang="tr-TR" dirty="0"/>
+              <a:t>	</a:t>
+            </a:r>
+            <a:r>
+              <a:rPr lang="tr-TR" dirty="0" err="1" smtClean="0"/>
+              <a:t>strictcrlpolicy</a:t>
+            </a:r>
+            <a:r>
+              <a:rPr lang="tr-TR" dirty="0" smtClean="0"/>
+              <a:t>=</a:t>
+            </a:r>
+            <a:r>
+              <a:rPr lang="tr-TR" dirty="0" err="1" smtClean="0"/>
+              <a:t>no</a:t>
+            </a:r>
+            <a:endParaRPr lang="tr-TR" dirty="0"/>
+          </a:p>
+          <a:p>
+            <a:pPr>
+              <a:buFont typeface="Wingdings" panose="05000000000000000000" pitchFamily="2" charset="2"/>
+              <a:buChar char="v"/>
+            </a:pPr>
+            <a:r>
+              <a:rPr lang="tr-TR" dirty="0" err="1"/>
+              <a:t>conn</a:t>
+            </a:r>
+            <a:r>
+              <a:rPr lang="tr-TR" dirty="0"/>
+              <a:t> %</a:t>
+            </a:r>
+            <a:r>
+              <a:rPr lang="tr-TR" dirty="0" err="1" smtClean="0"/>
+              <a:t>default</a:t>
+            </a:r>
+            <a:endParaRPr lang="tr-TR" dirty="0"/>
+          </a:p>
+          <a:p>
+            <a:pPr>
+              <a:buFont typeface="Wingdings" panose="05000000000000000000" pitchFamily="2" charset="2"/>
+              <a:buChar char="v"/>
+            </a:pPr>
+            <a:r>
+              <a:rPr lang="tr-TR" dirty="0" err="1"/>
+              <a:t>conn</a:t>
+            </a:r>
+            <a:r>
+              <a:rPr lang="tr-TR" dirty="0"/>
+              <a:t> </a:t>
+            </a:r>
+            <a:r>
+              <a:rPr lang="tr-TR" dirty="0" err="1"/>
+              <a:t>tunnel</a:t>
+            </a:r>
+            <a:r>
+              <a:rPr lang="tr-TR" dirty="0"/>
+              <a:t> </a:t>
+            </a:r>
+            <a:r>
+              <a:rPr lang="tr-TR" dirty="0" smtClean="0"/>
+              <a:t>#</a:t>
+            </a:r>
+            <a:endParaRPr lang="tr-TR" dirty="0"/>
+          </a:p>
+          <a:p>
+            <a:pPr marL="0" indent="0">
+              <a:buNone/>
+            </a:pPr>
+            <a:r>
+              <a:rPr lang="tr-TR" dirty="0"/>
+              <a:t>	</a:t>
+            </a:r>
+            <a:r>
+              <a:rPr lang="tr-TR" dirty="0" err="1" smtClean="0"/>
+              <a:t>left</a:t>
+            </a:r>
+            <a:r>
+              <a:rPr lang="tr-TR" dirty="0" smtClean="0"/>
+              <a:t>=192.168.50.5</a:t>
+            </a:r>
+            <a:endParaRPr lang="tr-TR" dirty="0"/>
+          </a:p>
+          <a:p>
+            <a:pPr marL="0" indent="0">
+              <a:buNone/>
+            </a:pPr>
+            <a:r>
+              <a:rPr lang="tr-TR" dirty="0"/>
+              <a:t>	</a:t>
+            </a:r>
+            <a:r>
+              <a:rPr lang="tr-TR" dirty="0" err="1" smtClean="0"/>
+              <a:t>leftsubnet</a:t>
+            </a:r>
+            <a:r>
+              <a:rPr lang="tr-TR" dirty="0" smtClean="0"/>
+              <a:t>=192.168.50.0/24</a:t>
+            </a:r>
+            <a:endParaRPr lang="tr-TR" dirty="0"/>
+          </a:p>
+          <a:p>
+            <a:pPr marL="0" indent="0">
+              <a:buNone/>
+            </a:pPr>
+            <a:r>
+              <a:rPr lang="tr-TR" dirty="0"/>
+              <a:t>	</a:t>
+            </a:r>
+            <a:r>
+              <a:rPr lang="tr-TR" dirty="0" err="1" smtClean="0"/>
+              <a:t>right</a:t>
+            </a:r>
+            <a:r>
+              <a:rPr lang="tr-TR" dirty="0" smtClean="0"/>
+              <a:t>=192.168.50.4</a:t>
+            </a:r>
+            <a:endParaRPr lang="tr-TR" dirty="0"/>
+          </a:p>
+          <a:p>
+            <a:pPr marL="0" indent="0">
+              <a:buNone/>
+            </a:pPr>
+            <a:r>
+              <a:rPr lang="tr-TR" dirty="0"/>
+              <a:t>	</a:t>
+            </a:r>
+            <a:r>
+              <a:rPr lang="tr-TR" dirty="0" err="1" smtClean="0"/>
+              <a:t>rightsubnet</a:t>
+            </a:r>
+            <a:r>
+              <a:rPr lang="tr-TR" dirty="0" smtClean="0"/>
+              <a:t>=192.168.50.0/24</a:t>
+            </a:r>
+            <a:endParaRPr lang="tr-TR" dirty="0"/>
+          </a:p>
+          <a:p>
+            <a:pPr marL="0" indent="0">
+              <a:buNone/>
+            </a:pPr>
+            <a:r>
+              <a:rPr lang="tr-TR" dirty="0"/>
+              <a:t>	</a:t>
+            </a:r>
+            <a:r>
+              <a:rPr lang="tr-TR" dirty="0" err="1"/>
+              <a:t>ike</a:t>
+            </a:r>
+            <a:r>
+              <a:rPr lang="tr-TR" dirty="0"/>
+              <a:t>=aes256-sha2_256-modp1024</a:t>
+            </a:r>
+            <a:r>
+              <a:rPr lang="tr-TR" dirty="0" smtClean="0"/>
+              <a:t>!</a:t>
+            </a:r>
+            <a:endParaRPr lang="tr-TR" dirty="0"/>
+          </a:p>
+          <a:p>
+            <a:pPr marL="0" indent="0">
+              <a:buNone/>
+            </a:pPr>
+            <a:r>
+              <a:rPr lang="tr-TR" dirty="0"/>
+              <a:t>	</a:t>
+            </a:r>
+            <a:r>
+              <a:rPr lang="tr-TR" dirty="0" err="1"/>
+              <a:t>esp</a:t>
+            </a:r>
+            <a:r>
+              <a:rPr lang="tr-TR" dirty="0"/>
+              <a:t>=aes256-sha2_256</a:t>
+            </a:r>
+            <a:r>
+              <a:rPr lang="tr-TR" dirty="0" smtClean="0"/>
+              <a:t>!</a:t>
+            </a:r>
+            <a:endParaRPr lang="tr-TR" dirty="0"/>
+          </a:p>
+          <a:p>
+            <a:pPr marL="0" indent="0">
+              <a:buNone/>
+            </a:pPr>
+            <a:r>
+              <a:rPr lang="tr-TR" dirty="0"/>
+              <a:t>	</a:t>
+            </a:r>
+            <a:r>
+              <a:rPr lang="tr-TR" dirty="0" err="1" smtClean="0"/>
+              <a:t>keyingtries</a:t>
+            </a:r>
+            <a:r>
+              <a:rPr lang="tr-TR" dirty="0" smtClean="0"/>
+              <a:t>=0</a:t>
+            </a:r>
+            <a:endParaRPr lang="tr-TR" dirty="0"/>
+          </a:p>
+          <a:p>
+            <a:pPr marL="0" indent="0">
+              <a:buNone/>
+            </a:pPr>
+            <a:r>
+              <a:rPr lang="tr-TR" dirty="0"/>
+              <a:t>	</a:t>
+            </a:r>
+            <a:r>
+              <a:rPr lang="tr-TR" dirty="0" err="1" smtClean="0"/>
+              <a:t>ikelifetime</a:t>
+            </a:r>
+            <a:r>
+              <a:rPr lang="tr-TR" dirty="0" smtClean="0"/>
+              <a:t>=1h</a:t>
+            </a:r>
+            <a:endParaRPr lang="tr-TR" dirty="0"/>
+          </a:p>
+          <a:p>
+            <a:pPr marL="0" indent="0">
+              <a:buNone/>
+            </a:pPr>
+            <a:r>
+              <a:rPr lang="tr-TR" dirty="0"/>
+              <a:t>	</a:t>
+            </a:r>
+            <a:r>
+              <a:rPr lang="tr-TR" dirty="0" err="1" smtClean="0"/>
+              <a:t>lifetime</a:t>
+            </a:r>
+            <a:r>
+              <a:rPr lang="tr-TR" dirty="0" smtClean="0"/>
+              <a:t>=3m</a:t>
+            </a:r>
+            <a:endParaRPr lang="tr-TR" dirty="0"/>
+          </a:p>
+          <a:p>
+            <a:pPr marL="0" indent="0">
+              <a:buNone/>
+            </a:pPr>
+            <a:r>
+              <a:rPr lang="tr-TR" dirty="0"/>
+              <a:t>	</a:t>
+            </a:r>
+            <a:r>
+              <a:rPr lang="tr-TR" dirty="0" err="1" smtClean="0"/>
+              <a:t>dpddelay</a:t>
+            </a:r>
+            <a:r>
+              <a:rPr lang="tr-TR" dirty="0" smtClean="0"/>
+              <a:t>=30</a:t>
+            </a:r>
+            <a:endParaRPr lang="tr-TR" dirty="0"/>
+          </a:p>
+          <a:p>
+            <a:pPr marL="0" indent="0">
+              <a:buNone/>
+            </a:pPr>
+            <a:r>
+              <a:rPr lang="tr-TR" dirty="0"/>
+              <a:t>	</a:t>
+            </a:r>
+            <a:r>
+              <a:rPr lang="tr-TR" dirty="0" err="1" smtClean="0"/>
+              <a:t>dpdtimeout</a:t>
+            </a:r>
+            <a:r>
+              <a:rPr lang="tr-TR" dirty="0" smtClean="0"/>
+              <a:t>=120</a:t>
+            </a:r>
+            <a:endParaRPr lang="tr-TR" dirty="0"/>
+          </a:p>
+          <a:p>
+            <a:pPr marL="0" indent="0">
+              <a:buNone/>
+            </a:pPr>
+            <a:r>
+              <a:rPr lang="tr-TR" dirty="0"/>
+              <a:t>	</a:t>
+            </a:r>
+            <a:r>
+              <a:rPr lang="tr-TR" dirty="0" err="1" smtClean="0"/>
+              <a:t>dpdaction</a:t>
+            </a:r>
+            <a:r>
+              <a:rPr lang="tr-TR" dirty="0" smtClean="0"/>
+              <a:t>=</a:t>
+            </a:r>
+            <a:r>
+              <a:rPr lang="tr-TR" dirty="0" err="1" smtClean="0"/>
+              <a:t>clear</a:t>
+            </a:r>
+            <a:endParaRPr lang="tr-TR" dirty="0"/>
+          </a:p>
+          <a:p>
+            <a:pPr marL="0" indent="0">
+              <a:buNone/>
+            </a:pPr>
+            <a:r>
+              <a:rPr lang="tr-TR" dirty="0"/>
+              <a:t>	</a:t>
+            </a:r>
+            <a:r>
+              <a:rPr lang="tr-TR" dirty="0" err="1" smtClean="0"/>
+              <a:t>authby</a:t>
+            </a:r>
+            <a:r>
+              <a:rPr lang="tr-TR" dirty="0" smtClean="0"/>
+              <a:t>=</a:t>
+            </a:r>
+            <a:r>
+              <a:rPr lang="tr-TR" dirty="0" err="1" smtClean="0"/>
+              <a:t>secret</a:t>
+            </a:r>
+            <a:endParaRPr lang="tr-TR" dirty="0"/>
+          </a:p>
+          <a:p>
+            <a:pPr marL="0" indent="0">
+              <a:buNone/>
+            </a:pPr>
+            <a:r>
+              <a:rPr lang="tr-TR" dirty="0"/>
+              <a:t>	</a:t>
+            </a:r>
+            <a:r>
+              <a:rPr lang="tr-TR" dirty="0" err="1" smtClean="0"/>
+              <a:t>auto</a:t>
+            </a:r>
+            <a:r>
+              <a:rPr lang="tr-TR" dirty="0" smtClean="0"/>
+              <a:t>=start</a:t>
+            </a:r>
+            <a:endParaRPr lang="tr-TR" dirty="0"/>
+          </a:p>
+          <a:p>
+            <a:pPr marL="0" indent="0">
+              <a:buNone/>
+            </a:pPr>
+            <a:r>
+              <a:rPr lang="tr-TR" dirty="0"/>
+              <a:t>	</a:t>
+            </a:r>
+            <a:r>
+              <a:rPr lang="tr-TR" dirty="0" err="1" smtClean="0"/>
+              <a:t>keyexchange</a:t>
+            </a:r>
+            <a:r>
+              <a:rPr lang="tr-TR" dirty="0" smtClean="0"/>
+              <a:t>=ikev2</a:t>
+            </a:r>
+            <a:endParaRPr lang="tr-TR" dirty="0"/>
+          </a:p>
+          <a:p>
+            <a:pPr marL="0" indent="0">
+              <a:buNone/>
+            </a:pPr>
+            <a:r>
+              <a:rPr lang="tr-TR" dirty="0"/>
+              <a:t>	</a:t>
+            </a:r>
+            <a:r>
+              <a:rPr lang="tr-TR" dirty="0" err="1"/>
+              <a:t>type</a:t>
+            </a:r>
+            <a:r>
+              <a:rPr lang="tr-TR" dirty="0"/>
+              <a:t>=</a:t>
+            </a:r>
+            <a:r>
+              <a:rPr lang="tr-TR" dirty="0" err="1"/>
+              <a:t>tunnel</a:t>
+            </a:r>
+            <a:endParaRPr lang="tr-TR" dirty="0"/>
+          </a:p>
+        </p:txBody>
+      </p:sp>
+      <p:cxnSp>
+        <p:nvCxnSpPr>
+          <p:cNvPr id="5" name="Düz Ok Bağlayıcısı 4"/>
+          <p:cNvCxnSpPr/>
+          <p:nvPr/>
+        </p:nvCxnSpPr>
+        <p:spPr>
+          <a:xfrm>
+            <a:off x="6134470" y="4383797"/>
+            <a:ext cx="1866912" cy="0"/>
+          </a:xfrm>
+          <a:prstGeom prst="straightConnector1">
+            <a:avLst/>
+          </a:prstGeom>
+          <a:ln>
+            <a:tailEnd type="triangle"/>
+          </a:ln>
+        </p:spPr>
+        <p:style>
+          <a:lnRef idx="1">
+            <a:schemeClr val="accent1"/>
+          </a:lnRef>
+          <a:fillRef idx="0">
+            <a:schemeClr val="accent1"/>
+          </a:fillRef>
+          <a:effectRef idx="0">
+            <a:schemeClr val="accent1"/>
+          </a:effectRef>
+          <a:fontRef idx="minor">
+            <a:schemeClr val="tx1"/>
+          </a:fontRef>
+        </p:style>
+      </p:cxnSp>
+      <p:sp>
+        <p:nvSpPr>
+          <p:cNvPr id="6" name="Metin kutusu 5"/>
+          <p:cNvSpPr txBox="1"/>
+          <p:nvPr/>
+        </p:nvSpPr>
+        <p:spPr>
+          <a:xfrm>
+            <a:off x="8886177" y="4129128"/>
+            <a:ext cx="1900191" cy="369332"/>
+          </a:xfrm>
+          <a:prstGeom prst="rect">
+            <a:avLst/>
+          </a:prstGeom>
+          <a:noFill/>
+        </p:spPr>
+        <p:txBody>
+          <a:bodyPr wrap="square" rtlCol="0">
+            <a:spAutoFit/>
+          </a:bodyPr>
+          <a:lstStyle/>
+          <a:p>
+            <a:r>
+              <a:rPr lang="en-GB" dirty="0" smtClean="0">
+                <a:solidFill>
+                  <a:srgbClr val="FF0000"/>
+                </a:solidFill>
+              </a:rPr>
+              <a:t>Ends connection</a:t>
+            </a:r>
+            <a:endParaRPr lang="tr-TR" dirty="0">
+              <a:solidFill>
+                <a:srgbClr val="FF0000"/>
+              </a:solidFill>
+            </a:endParaRPr>
+          </a:p>
+        </p:txBody>
+      </p:sp>
+      <p:cxnSp>
+        <p:nvCxnSpPr>
+          <p:cNvPr id="8" name="Düz Ok Bağlayıcısı 7"/>
+          <p:cNvCxnSpPr/>
+          <p:nvPr/>
+        </p:nvCxnSpPr>
+        <p:spPr>
+          <a:xfrm flipV="1">
+            <a:off x="6045693" y="4565788"/>
+            <a:ext cx="1931961" cy="13320"/>
+          </a:xfrm>
+          <a:prstGeom prst="straightConnector1">
+            <a:avLst/>
+          </a:prstGeom>
+          <a:ln>
+            <a:tailEnd type="triangle"/>
+          </a:ln>
+        </p:spPr>
+        <p:style>
+          <a:lnRef idx="1">
+            <a:schemeClr val="accent1"/>
+          </a:lnRef>
+          <a:fillRef idx="0">
+            <a:schemeClr val="accent1"/>
+          </a:fillRef>
+          <a:effectRef idx="0">
+            <a:schemeClr val="accent1"/>
+          </a:effectRef>
+          <a:fontRef idx="minor">
+            <a:schemeClr val="tx1"/>
+          </a:fontRef>
+        </p:style>
+      </p:cxnSp>
+      <p:sp>
+        <p:nvSpPr>
+          <p:cNvPr id="9" name="Metin kutusu 8"/>
+          <p:cNvSpPr txBox="1"/>
+          <p:nvPr/>
+        </p:nvSpPr>
+        <p:spPr>
+          <a:xfrm>
+            <a:off x="8886177" y="4383797"/>
+            <a:ext cx="2166137" cy="369332"/>
+          </a:xfrm>
+          <a:prstGeom prst="rect">
+            <a:avLst/>
+          </a:prstGeom>
+          <a:noFill/>
+        </p:spPr>
+        <p:txBody>
+          <a:bodyPr wrap="square" rtlCol="0">
+            <a:spAutoFit/>
+          </a:bodyPr>
+          <a:lstStyle/>
+          <a:p>
+            <a:r>
+              <a:rPr lang="en-GB" dirty="0" smtClean="0">
+                <a:solidFill>
+                  <a:srgbClr val="FF0000"/>
+                </a:solidFill>
+              </a:rPr>
+              <a:t>Renews CHILD_SA</a:t>
+            </a:r>
+            <a:endParaRPr lang="tr-TR" dirty="0">
+              <a:solidFill>
+                <a:srgbClr val="FF0000"/>
+              </a:solidFill>
+            </a:endParaRPr>
+          </a:p>
+        </p:txBody>
+      </p:sp>
+      <p:sp>
+        <p:nvSpPr>
+          <p:cNvPr id="10" name="Dikdörtgen 9"/>
+          <p:cNvSpPr/>
+          <p:nvPr/>
+        </p:nvSpPr>
+        <p:spPr>
+          <a:xfrm>
+            <a:off x="5397624" y="2874593"/>
+            <a:ext cx="1034282" cy="861134"/>
+          </a:xfrm>
+          <a:prstGeom prst="rect">
+            <a:avLst/>
+          </a:prstGeom>
+          <a:noFill/>
+        </p:spPr>
+        <p:style>
+          <a:lnRef idx="2">
+            <a:schemeClr val="accent1">
+              <a:shade val="50000"/>
+            </a:schemeClr>
+          </a:lnRef>
+          <a:fillRef idx="1">
+            <a:schemeClr val="accent1"/>
+          </a:fillRef>
+          <a:effectRef idx="0">
+            <a:schemeClr val="accent1"/>
+          </a:effectRef>
+          <a:fontRef idx="minor">
+            <a:schemeClr val="lt1"/>
+          </a:fontRef>
+        </p:style>
+        <p:txBody>
+          <a:bodyPr rtlCol="0" anchor="ctr"/>
+          <a:lstStyle/>
+          <a:p>
+            <a:pPr algn="ctr"/>
+            <a:endParaRPr lang="tr-TR"/>
+          </a:p>
+        </p:txBody>
+      </p:sp>
+      <p:cxnSp>
+        <p:nvCxnSpPr>
+          <p:cNvPr id="12" name="Düz Ok Bağlayıcısı 11"/>
+          <p:cNvCxnSpPr/>
+          <p:nvPr/>
+        </p:nvCxnSpPr>
+        <p:spPr>
+          <a:xfrm flipV="1">
+            <a:off x="6915705" y="3103819"/>
+            <a:ext cx="1294479" cy="10473"/>
+          </a:xfrm>
+          <a:prstGeom prst="straightConnector1">
+            <a:avLst/>
+          </a:prstGeom>
+          <a:ln>
+            <a:tailEnd type="triangle"/>
+          </a:ln>
+        </p:spPr>
+        <p:style>
+          <a:lnRef idx="1">
+            <a:schemeClr val="accent1"/>
+          </a:lnRef>
+          <a:fillRef idx="0">
+            <a:schemeClr val="accent1"/>
+          </a:fillRef>
+          <a:effectRef idx="0">
+            <a:schemeClr val="accent1"/>
+          </a:effectRef>
+          <a:fontRef idx="minor">
+            <a:schemeClr val="tx1"/>
+          </a:fontRef>
+        </p:style>
+      </p:cxnSp>
+      <p:sp>
+        <p:nvSpPr>
+          <p:cNvPr id="13" name="Metin kutusu 12"/>
+          <p:cNvSpPr txBox="1"/>
+          <p:nvPr/>
+        </p:nvSpPr>
+        <p:spPr>
+          <a:xfrm>
+            <a:off x="8886176" y="2874593"/>
+            <a:ext cx="2972730" cy="369332"/>
+          </a:xfrm>
+          <a:prstGeom prst="rect">
+            <a:avLst/>
+          </a:prstGeom>
+          <a:noFill/>
+        </p:spPr>
+        <p:txBody>
+          <a:bodyPr wrap="square" rtlCol="0">
+            <a:spAutoFit/>
+          </a:bodyPr>
+          <a:lstStyle/>
+          <a:p>
+            <a:r>
+              <a:rPr lang="en-GB" dirty="0" err="1" smtClean="0">
+                <a:solidFill>
+                  <a:srgbClr val="FF0000"/>
+                </a:solidFill>
+              </a:rPr>
+              <a:t>Communucation</a:t>
+            </a:r>
+            <a:r>
+              <a:rPr lang="en-GB" dirty="0" smtClean="0">
+                <a:solidFill>
+                  <a:srgbClr val="FF0000"/>
+                </a:solidFill>
+              </a:rPr>
+              <a:t> interfaces</a:t>
+            </a:r>
+            <a:endParaRPr lang="tr-TR" dirty="0">
+              <a:solidFill>
+                <a:srgbClr val="FF0000"/>
+              </a:solidFill>
+            </a:endParaRPr>
+          </a:p>
+        </p:txBody>
+      </p:sp>
+      <p:cxnSp>
+        <p:nvCxnSpPr>
+          <p:cNvPr id="15" name="Düz Ok Bağlayıcısı 14"/>
+          <p:cNvCxnSpPr/>
+          <p:nvPr/>
+        </p:nvCxnSpPr>
+        <p:spPr>
+          <a:xfrm>
+            <a:off x="6809172" y="3758830"/>
+            <a:ext cx="1444092" cy="5295"/>
+          </a:xfrm>
+          <a:prstGeom prst="straightConnector1">
+            <a:avLst/>
+          </a:prstGeom>
+          <a:ln>
+            <a:tailEnd type="triangle"/>
+          </a:ln>
+        </p:spPr>
+        <p:style>
+          <a:lnRef idx="1">
+            <a:schemeClr val="accent1"/>
+          </a:lnRef>
+          <a:fillRef idx="0">
+            <a:schemeClr val="accent1"/>
+          </a:fillRef>
+          <a:effectRef idx="0">
+            <a:schemeClr val="accent1"/>
+          </a:effectRef>
+          <a:fontRef idx="minor">
+            <a:schemeClr val="tx1"/>
+          </a:fontRef>
+        </p:style>
+      </p:cxnSp>
+      <p:sp>
+        <p:nvSpPr>
+          <p:cNvPr id="16" name="Metin kutusu 15"/>
+          <p:cNvSpPr txBox="1"/>
+          <p:nvPr/>
+        </p:nvSpPr>
+        <p:spPr>
+          <a:xfrm>
+            <a:off x="8886176" y="3435664"/>
+            <a:ext cx="2322256" cy="646331"/>
+          </a:xfrm>
+          <a:prstGeom prst="rect">
+            <a:avLst/>
+          </a:prstGeom>
+          <a:noFill/>
+        </p:spPr>
+        <p:txBody>
+          <a:bodyPr wrap="square" rtlCol="0">
+            <a:spAutoFit/>
+          </a:bodyPr>
+          <a:lstStyle/>
+          <a:p>
+            <a:r>
+              <a:rPr lang="en-GB" dirty="0" smtClean="0">
+                <a:solidFill>
+                  <a:srgbClr val="FF0000"/>
+                </a:solidFill>
+              </a:rPr>
+              <a:t>D-H value &amp; encryption method</a:t>
+            </a:r>
+            <a:endParaRPr lang="tr-TR" dirty="0">
+              <a:solidFill>
+                <a:srgbClr val="FF0000"/>
+              </a:solidFill>
+            </a:endParaRPr>
+          </a:p>
+        </p:txBody>
+      </p:sp>
+      <p:sp>
+        <p:nvSpPr>
+          <p:cNvPr id="24" name="Dikdörtgen 23"/>
+          <p:cNvSpPr/>
+          <p:nvPr/>
+        </p:nvSpPr>
+        <p:spPr>
+          <a:xfrm>
+            <a:off x="5442011" y="4714045"/>
+            <a:ext cx="780591" cy="593030"/>
+          </a:xfrm>
+          <a:prstGeom prst="rect">
+            <a:avLst/>
+          </a:prstGeom>
+          <a:noFill/>
+        </p:spPr>
+        <p:style>
+          <a:lnRef idx="2">
+            <a:schemeClr val="accent1">
+              <a:shade val="50000"/>
+            </a:schemeClr>
+          </a:lnRef>
+          <a:fillRef idx="1">
+            <a:schemeClr val="accent1"/>
+          </a:fillRef>
+          <a:effectRef idx="0">
+            <a:schemeClr val="accent1"/>
+          </a:effectRef>
+          <a:fontRef idx="minor">
+            <a:schemeClr val="lt1"/>
+          </a:fontRef>
+        </p:style>
+        <p:txBody>
+          <a:bodyPr rtlCol="0" anchor="ctr"/>
+          <a:lstStyle/>
+          <a:p>
+            <a:pPr algn="ctr"/>
+            <a:endParaRPr lang="tr-TR" dirty="0"/>
+          </a:p>
+        </p:txBody>
+      </p:sp>
+      <p:cxnSp>
+        <p:nvCxnSpPr>
+          <p:cNvPr id="26" name="Düz Ok Bağlayıcısı 25"/>
+          <p:cNvCxnSpPr/>
+          <p:nvPr/>
+        </p:nvCxnSpPr>
+        <p:spPr>
+          <a:xfrm>
+            <a:off x="6604986" y="5010560"/>
+            <a:ext cx="1522152" cy="0"/>
+          </a:xfrm>
+          <a:prstGeom prst="straightConnector1">
+            <a:avLst/>
+          </a:prstGeom>
+          <a:ln>
+            <a:tailEnd type="triangle"/>
+          </a:ln>
+        </p:spPr>
+        <p:style>
+          <a:lnRef idx="1">
+            <a:schemeClr val="accent1"/>
+          </a:lnRef>
+          <a:fillRef idx="0">
+            <a:schemeClr val="accent1"/>
+          </a:fillRef>
+          <a:effectRef idx="0">
+            <a:schemeClr val="accent1"/>
+          </a:effectRef>
+          <a:fontRef idx="minor">
+            <a:schemeClr val="tx1"/>
+          </a:fontRef>
+        </p:style>
+      </p:cxnSp>
+      <p:sp>
+        <p:nvSpPr>
+          <p:cNvPr id="27" name="Metin kutusu 26"/>
+          <p:cNvSpPr txBox="1"/>
+          <p:nvPr/>
+        </p:nvSpPr>
+        <p:spPr>
+          <a:xfrm>
+            <a:off x="8886177" y="4826167"/>
+            <a:ext cx="2539384" cy="369332"/>
+          </a:xfrm>
+          <a:prstGeom prst="rect">
+            <a:avLst/>
+          </a:prstGeom>
+          <a:noFill/>
+        </p:spPr>
+        <p:txBody>
+          <a:bodyPr wrap="square" rtlCol="0">
+            <a:spAutoFit/>
+          </a:bodyPr>
+          <a:lstStyle/>
+          <a:p>
+            <a:r>
+              <a:rPr lang="en-GB" dirty="0" smtClean="0">
+                <a:solidFill>
+                  <a:srgbClr val="FF0000"/>
+                </a:solidFill>
+              </a:rPr>
+              <a:t>Dead-peer- detection</a:t>
+            </a:r>
+            <a:endParaRPr lang="tr-TR" dirty="0">
+              <a:solidFill>
+                <a:srgbClr val="FF0000"/>
+              </a:solidFill>
+            </a:endParaRPr>
+          </a:p>
+        </p:txBody>
+      </p:sp>
+      <p:sp>
+        <p:nvSpPr>
+          <p:cNvPr id="33" name="İçerik Yer Tutucusu 2"/>
+          <p:cNvSpPr txBox="1">
+            <a:spLocks/>
+          </p:cNvSpPr>
+          <p:nvPr/>
+        </p:nvSpPr>
+        <p:spPr>
+          <a:xfrm>
+            <a:off x="838200" y="1825625"/>
+            <a:ext cx="3620245" cy="4351338"/>
+          </a:xfrm>
+          <a:prstGeom prst="rect">
+            <a:avLst/>
+          </a:prstGeom>
+        </p:spPr>
+        <p:txBody>
+          <a:bodyPr vert="horz" lIns="91440" tIns="45720" rIns="91440" bIns="45720" rtlCol="0">
+            <a:normAutofit/>
+          </a:bodyPr>
+          <a:lstStyle>
+            <a:lvl1pPr marL="228600" indent="-228600" algn="l" defTabSz="914400" rtl="0" eaLnBrk="1" latinLnBrk="0" hangingPunct="1">
+              <a:lnSpc>
+                <a:spcPct val="90000"/>
+              </a:lnSpc>
+              <a:spcBef>
+                <a:spcPts val="1000"/>
+              </a:spcBef>
+              <a:buFont typeface="Arial" panose="020B0604020202020204" pitchFamily="34" charset="0"/>
+              <a:buChar char="•"/>
+              <a:defRPr sz="2800" kern="1200">
+                <a:solidFill>
+                  <a:schemeClr val="tx1"/>
+                </a:solidFill>
+                <a:latin typeface="+mn-lt"/>
+                <a:ea typeface="+mn-ea"/>
+                <a:cs typeface="+mn-cs"/>
+              </a:defRPr>
+            </a:lvl1pPr>
+            <a:lvl2pPr marL="685800" indent="-228600" algn="l" defTabSz="914400" rtl="0" eaLnBrk="1" latinLnBrk="0" hangingPunct="1">
+              <a:lnSpc>
+                <a:spcPct val="90000"/>
+              </a:lnSpc>
+              <a:spcBef>
+                <a:spcPts val="500"/>
+              </a:spcBef>
+              <a:buFont typeface="Arial" panose="020B0604020202020204" pitchFamily="34" charset="0"/>
+              <a:buChar char="•"/>
+              <a:defRPr sz="2400" kern="1200">
+                <a:solidFill>
+                  <a:schemeClr val="tx1"/>
+                </a:solidFill>
+                <a:latin typeface="+mn-lt"/>
+                <a:ea typeface="+mn-ea"/>
+                <a:cs typeface="+mn-cs"/>
+              </a:defRPr>
+            </a:lvl2pPr>
+            <a:lvl3pPr marL="1143000" indent="-228600" algn="l" defTabSz="914400" rtl="0" eaLnBrk="1" latinLnBrk="0" hangingPunct="1">
+              <a:lnSpc>
+                <a:spcPct val="90000"/>
+              </a:lnSpc>
+              <a:spcBef>
+                <a:spcPts val="500"/>
+              </a:spcBef>
+              <a:buFont typeface="Arial" panose="020B0604020202020204" pitchFamily="34" charset="0"/>
+              <a:buChar char="•"/>
+              <a:defRPr sz="2000" kern="1200">
+                <a:solidFill>
+                  <a:schemeClr val="tx1"/>
+                </a:solidFill>
+                <a:latin typeface="+mn-lt"/>
+                <a:ea typeface="+mn-ea"/>
+                <a:cs typeface="+mn-cs"/>
+              </a:defRPr>
+            </a:lvl3pPr>
+            <a:lvl4pPr marL="1600200" indent="-228600" algn="l" defTabSz="914400" rtl="0" eaLnBrk="1" latinLnBrk="0" hangingPunct="1">
+              <a:lnSpc>
+                <a:spcPct val="90000"/>
+              </a:lnSpc>
+              <a:spcBef>
+                <a:spcPts val="500"/>
+              </a:spcBef>
+              <a:buFont typeface="Arial" panose="020B0604020202020204" pitchFamily="34" charset="0"/>
+              <a:buChar char="•"/>
+              <a:defRPr sz="1800" kern="1200">
+                <a:solidFill>
+                  <a:schemeClr val="tx1"/>
+                </a:solidFill>
+                <a:latin typeface="+mn-lt"/>
+                <a:ea typeface="+mn-ea"/>
+                <a:cs typeface="+mn-cs"/>
+              </a:defRPr>
+            </a:lvl4pPr>
+            <a:lvl5pPr marL="2057400" indent="-228600" algn="l" defTabSz="914400" rtl="0" eaLnBrk="1" latinLnBrk="0" hangingPunct="1">
+              <a:lnSpc>
+                <a:spcPct val="90000"/>
+              </a:lnSpc>
+              <a:spcBef>
+                <a:spcPts val="500"/>
+              </a:spcBef>
+              <a:buFont typeface="Arial" panose="020B0604020202020204" pitchFamily="34" charset="0"/>
+              <a:buChar char="•"/>
+              <a:defRPr sz="1800" kern="1200">
+                <a:solidFill>
+                  <a:schemeClr val="tx1"/>
+                </a:solidFill>
+                <a:latin typeface="+mn-lt"/>
+                <a:ea typeface="+mn-ea"/>
+                <a:cs typeface="+mn-cs"/>
+              </a:defRPr>
+            </a:lvl5pPr>
+            <a:lvl6pPr marL="2514600" indent="-228600" algn="l" defTabSz="914400" rtl="0" eaLnBrk="1" latinLnBrk="0" hangingPunct="1">
+              <a:lnSpc>
+                <a:spcPct val="90000"/>
+              </a:lnSpc>
+              <a:spcBef>
+                <a:spcPts val="500"/>
+              </a:spcBef>
+              <a:buFont typeface="Arial" panose="020B0604020202020204" pitchFamily="34" charset="0"/>
+              <a:buChar char="•"/>
+              <a:defRPr sz="1800" kern="1200">
+                <a:solidFill>
+                  <a:schemeClr val="tx1"/>
+                </a:solidFill>
+                <a:latin typeface="+mn-lt"/>
+                <a:ea typeface="+mn-ea"/>
+                <a:cs typeface="+mn-cs"/>
+              </a:defRPr>
+            </a:lvl6pPr>
+            <a:lvl7pPr marL="2971800" indent="-228600" algn="l" defTabSz="914400" rtl="0" eaLnBrk="1" latinLnBrk="0" hangingPunct="1">
+              <a:lnSpc>
+                <a:spcPct val="90000"/>
+              </a:lnSpc>
+              <a:spcBef>
+                <a:spcPts val="500"/>
+              </a:spcBef>
+              <a:buFont typeface="Arial" panose="020B0604020202020204" pitchFamily="34" charset="0"/>
+              <a:buChar char="•"/>
+              <a:defRPr sz="1800" kern="1200">
+                <a:solidFill>
+                  <a:schemeClr val="tx1"/>
+                </a:solidFill>
+                <a:latin typeface="+mn-lt"/>
+                <a:ea typeface="+mn-ea"/>
+                <a:cs typeface="+mn-cs"/>
+              </a:defRPr>
+            </a:lvl7pPr>
+            <a:lvl8pPr marL="3429000" indent="-228600" algn="l" defTabSz="914400" rtl="0" eaLnBrk="1" latinLnBrk="0" hangingPunct="1">
+              <a:lnSpc>
+                <a:spcPct val="90000"/>
+              </a:lnSpc>
+              <a:spcBef>
+                <a:spcPts val="500"/>
+              </a:spcBef>
+              <a:buFont typeface="Arial" panose="020B0604020202020204" pitchFamily="34" charset="0"/>
+              <a:buChar char="•"/>
+              <a:defRPr sz="1800" kern="1200">
+                <a:solidFill>
+                  <a:schemeClr val="tx1"/>
+                </a:solidFill>
+                <a:latin typeface="+mn-lt"/>
+                <a:ea typeface="+mn-ea"/>
+                <a:cs typeface="+mn-cs"/>
+              </a:defRPr>
+            </a:lvl8pPr>
+            <a:lvl9pPr marL="3886200" indent="-228600" algn="l" defTabSz="914400" rtl="0" eaLnBrk="1" latinLnBrk="0" hangingPunct="1">
+              <a:lnSpc>
+                <a:spcPct val="90000"/>
+              </a:lnSpc>
+              <a:spcBef>
+                <a:spcPts val="500"/>
+              </a:spcBef>
+              <a:buFont typeface="Arial" panose="020B0604020202020204" pitchFamily="34" charset="0"/>
+              <a:buChar char="•"/>
+              <a:defRPr sz="1800" kern="1200">
+                <a:solidFill>
+                  <a:schemeClr val="tx1"/>
+                </a:solidFill>
+                <a:latin typeface="+mn-lt"/>
+                <a:ea typeface="+mn-ea"/>
+                <a:cs typeface="+mn-cs"/>
+              </a:defRPr>
+            </a:lvl9pPr>
+          </a:lstStyle>
+          <a:p>
+            <a:pPr marL="0" indent="0">
+              <a:buFont typeface="Arial" panose="020B0604020202020204" pitchFamily="34" charset="0"/>
+              <a:buNone/>
+            </a:pPr>
+            <a:endParaRPr lang="en-GB" sz="2000" dirty="0" smtClean="0"/>
+          </a:p>
+          <a:p>
+            <a:pPr marL="0" indent="0">
+              <a:buFont typeface="Arial" panose="020B0604020202020204" pitchFamily="34" charset="0"/>
+              <a:buNone/>
+            </a:pPr>
+            <a:r>
+              <a:rPr lang="en-GB" sz="2000" dirty="0" smtClean="0"/>
+              <a:t>There are 3 different section</a:t>
+            </a:r>
+          </a:p>
+          <a:p>
+            <a:r>
+              <a:rPr lang="en-US" sz="2000" i="1" dirty="0" err="1" smtClean="0"/>
+              <a:t>config</a:t>
+            </a:r>
+            <a:r>
+              <a:rPr lang="en-US" sz="2000" i="1" dirty="0" smtClean="0"/>
+              <a:t> setup </a:t>
+            </a:r>
+            <a:r>
+              <a:rPr lang="en-US" sz="2000" dirty="0" smtClean="0"/>
+              <a:t>defines general configuration parameters     </a:t>
+            </a:r>
+          </a:p>
+          <a:p>
+            <a:r>
+              <a:rPr lang="en-US" sz="2000" i="1" dirty="0" smtClean="0"/>
+              <a:t>conn &lt;name&gt; </a:t>
+            </a:r>
+            <a:r>
+              <a:rPr lang="en-US" sz="2000" dirty="0" smtClean="0"/>
+              <a:t>defines a connection     </a:t>
+            </a:r>
+          </a:p>
+          <a:p>
+            <a:r>
+              <a:rPr lang="en-US" sz="2000" i="1" dirty="0" smtClean="0"/>
+              <a:t>ca &lt;name&gt; </a:t>
+            </a:r>
+            <a:r>
+              <a:rPr lang="en-US" sz="2000" dirty="0" smtClean="0"/>
+              <a:t>defines a certification authority</a:t>
+            </a:r>
+            <a:endParaRPr lang="tr-TR" sz="2000" dirty="0"/>
+          </a:p>
+        </p:txBody>
+      </p:sp>
+      <p:cxnSp>
+        <p:nvCxnSpPr>
+          <p:cNvPr id="7" name="Düz Ok Bağlayıcısı 6"/>
+          <p:cNvCxnSpPr/>
+          <p:nvPr/>
+        </p:nvCxnSpPr>
+        <p:spPr>
+          <a:xfrm flipV="1">
+            <a:off x="6222602" y="5397623"/>
+            <a:ext cx="1904536" cy="17756"/>
+          </a:xfrm>
+          <a:prstGeom prst="straightConnector1">
+            <a:avLst/>
+          </a:prstGeom>
+          <a:ln>
+            <a:tailEnd type="triangle"/>
+          </a:ln>
+        </p:spPr>
+        <p:style>
+          <a:lnRef idx="1">
+            <a:schemeClr val="accent1"/>
+          </a:lnRef>
+          <a:fillRef idx="0">
+            <a:schemeClr val="accent1"/>
+          </a:fillRef>
+          <a:effectRef idx="0">
+            <a:schemeClr val="accent1"/>
+          </a:effectRef>
+          <a:fontRef idx="minor">
+            <a:schemeClr val="tx1"/>
+          </a:fontRef>
+        </p:style>
+      </p:cxnSp>
+      <p:sp>
+        <p:nvSpPr>
+          <p:cNvPr id="11" name="Metin kutusu 10"/>
+          <p:cNvSpPr txBox="1"/>
+          <p:nvPr/>
+        </p:nvSpPr>
+        <p:spPr>
+          <a:xfrm>
+            <a:off x="8894780" y="5188683"/>
+            <a:ext cx="2369598" cy="369332"/>
+          </a:xfrm>
+          <a:prstGeom prst="rect">
+            <a:avLst/>
+          </a:prstGeom>
+          <a:noFill/>
+        </p:spPr>
+        <p:txBody>
+          <a:bodyPr wrap="square" rtlCol="0">
+            <a:spAutoFit/>
+          </a:bodyPr>
+          <a:lstStyle/>
+          <a:p>
+            <a:r>
+              <a:rPr lang="en-GB" dirty="0" smtClean="0">
+                <a:solidFill>
+                  <a:srgbClr val="FF0000"/>
+                </a:solidFill>
+              </a:rPr>
+              <a:t>Authentication method</a:t>
+            </a:r>
+            <a:endParaRPr lang="tr-TR" dirty="0">
+              <a:solidFill>
+                <a:srgbClr val="FF0000"/>
+              </a:solidFill>
+            </a:endParaRPr>
+          </a:p>
+        </p:txBody>
+      </p:sp>
+    </p:spTree>
+    <p:extLst>
+      <p:ext uri="{BB962C8B-B14F-4D97-AF65-F5344CB8AC3E}">
+        <p14:creationId xmlns:p14="http://schemas.microsoft.com/office/powerpoint/2010/main" val="1754880479"/>
+      </p:ext>
+    </p:extLst>
+  </p:cSld>
+  <p:clrMapOvr>
+    <a:masterClrMapping/>
+  </p:clrMapOvr>
+</p:sld>
+</file>
+
+<file path=ppt/slides/slide11.xml><?xml version="1.0" encoding="utf-8"?>
+<p:sld xmlns:a="http://schemas.openxmlformats.org/drawingml/2006/main" xmlns:r="http://schemas.openxmlformats.org/officeDocument/2006/relationships" xmlns:p="http://schemas.openxmlformats.org/presentationml/2006/main">
+  <p:cSld>
+    <p:spTree>
+      <p:nvGrpSpPr>
+        <p:cNvPr id="1" name=""/>
+        <p:cNvGrpSpPr/>
+        <p:nvPr/>
+      </p:nvGrpSpPr>
+      <p:grpSpPr>
+        <a:xfrm>
+          <a:off x="0" y="0"/>
+          <a:ext cx="0" cy="0"/>
+          <a:chOff x="0" y="0"/>
+          <a:chExt cx="0" cy="0"/>
+        </a:xfrm>
+      </p:grpSpPr>
+      <p:sp>
+        <p:nvSpPr>
+          <p:cNvPr id="2" name="Unvan 1"/>
+          <p:cNvSpPr>
+            <a:spLocks noGrp="1"/>
+          </p:cNvSpPr>
+          <p:nvPr>
+            <p:ph type="title"/>
+          </p:nvPr>
+        </p:nvSpPr>
         <p:spPr/>
         <p:txBody>
           <a:bodyPr/>
           <a:lstStyle/>
           <a:p>
-            <a:endParaRPr lang="tr-TR"/>
-          </a:p>
-        </p:txBody>
-      </p:sp>
+            <a:r>
+              <a:rPr lang="en-GB" dirty="0" smtClean="0"/>
+              <a:t>List of IKE Algorithms</a:t>
+            </a:r>
+            <a:endParaRPr lang="tr-TR" dirty="0"/>
+          </a:p>
+        </p:txBody>
+      </p:sp>
+      <p:pic>
+        <p:nvPicPr>
+          <p:cNvPr id="6" name="İçerik Yer Tutucusu 5"/>
+          <p:cNvPicPr>
+            <a:picLocks noGrp="1" noChangeAspect="1"/>
+          </p:cNvPicPr>
+          <p:nvPr>
+            <p:ph idx="1"/>
+          </p:nvPr>
+        </p:nvPicPr>
+        <p:blipFill>
+          <a:blip r:embed="rId2"/>
+          <a:stretch>
+            <a:fillRect/>
+          </a:stretch>
+        </p:blipFill>
+        <p:spPr>
+          <a:xfrm>
+            <a:off x="942975" y="2291556"/>
+            <a:ext cx="10306050" cy="3419475"/>
+          </a:xfrm>
+          <a:prstGeom prst="rect">
+            <a:avLst/>
+          </a:prstGeom>
+        </p:spPr>
+      </p:pic>
+    </p:spTree>
+    <p:extLst>
+      <p:ext uri="{BB962C8B-B14F-4D97-AF65-F5344CB8AC3E}">
+        <p14:creationId xmlns:p14="http://schemas.microsoft.com/office/powerpoint/2010/main" val="3869566757"/>
+      </p:ext>
+    </p:extLst>
+  </p:cSld>
+  <p:clrMapOvr>
+    <a:masterClrMapping/>
+  </p:clrMapOvr>
+</p:sld>
+</file>
+
+<file path=ppt/slides/slide12.xml><?xml version="1.0" encoding="utf-8"?>
+<p:sld xmlns:a="http://schemas.openxmlformats.org/drawingml/2006/main" xmlns:r="http://schemas.openxmlformats.org/officeDocument/2006/relationships" xmlns:p="http://schemas.openxmlformats.org/presentationml/2006/main">
+  <p:cSld>
+    <p:spTree>
+      <p:nvGrpSpPr>
+        <p:cNvPr id="1" name=""/>
+        <p:cNvGrpSpPr/>
+        <p:nvPr/>
+      </p:nvGrpSpPr>
+      <p:grpSpPr>
+        <a:xfrm>
+          <a:off x="0" y="0"/>
+          <a:ext cx="0" cy="0"/>
+          <a:chOff x="0" y="0"/>
+          <a:chExt cx="0" cy="0"/>
+        </a:xfrm>
+      </p:grpSpPr>
+      <p:sp>
+        <p:nvSpPr>
+          <p:cNvPr id="2" name="Unvan 1"/>
+          <p:cNvSpPr>
+            <a:spLocks noGrp="1"/>
+          </p:cNvSpPr>
+          <p:nvPr>
+            <p:ph type="title"/>
+          </p:nvPr>
+        </p:nvSpPr>
+        <p:spPr/>
+        <p:txBody>
+          <a:bodyPr/>
+          <a:lstStyle/>
+          <a:p>
+            <a:r>
+              <a:rPr lang="en-GB" dirty="0" smtClean="0"/>
+              <a:t>Running Process and Threads</a:t>
+            </a:r>
+            <a:endParaRPr lang="tr-TR" dirty="0"/>
+          </a:p>
+        </p:txBody>
+      </p:sp>
+      <p:sp>
+        <p:nvSpPr>
+          <p:cNvPr id="3" name="İçerik Yer Tutucusu 2"/>
+          <p:cNvSpPr>
+            <a:spLocks noGrp="1"/>
+          </p:cNvSpPr>
+          <p:nvPr>
+            <p:ph idx="1"/>
+          </p:nvPr>
+        </p:nvSpPr>
+        <p:spPr/>
+        <p:txBody>
+          <a:bodyPr/>
+          <a:lstStyle/>
+          <a:p>
+            <a:r>
+              <a:rPr lang="en-GB" sz="2000" dirty="0"/>
+              <a:t>The process after </a:t>
+            </a:r>
+            <a:r>
+              <a:rPr lang="en-GB" sz="2000" dirty="0" smtClean="0"/>
+              <a:t>IPsec </a:t>
+            </a:r>
+            <a:r>
+              <a:rPr lang="en-GB" sz="2000" dirty="0"/>
+              <a:t>starts </a:t>
+            </a:r>
+            <a:r>
+              <a:rPr lang="en-GB" sz="2000" dirty="0" smtClean="0"/>
+              <a:t>and all worker threads(16):</a:t>
+            </a:r>
+          </a:p>
+          <a:p>
+            <a:endParaRPr lang="en-GB" sz="2000" dirty="0"/>
+          </a:p>
+          <a:p>
+            <a:endParaRPr lang="en-GB" sz="2000" dirty="0" smtClean="0"/>
+          </a:p>
+          <a:p>
+            <a:endParaRPr lang="en-GB" sz="2000" dirty="0"/>
+          </a:p>
+          <a:p>
+            <a:endParaRPr lang="en-GB" sz="2000" dirty="0" smtClean="0"/>
+          </a:p>
+          <a:p>
+            <a:endParaRPr lang="en-GB" sz="2000" dirty="0"/>
+          </a:p>
+          <a:p>
+            <a:endParaRPr lang="en-GB" sz="2000" dirty="0" smtClean="0"/>
+          </a:p>
+          <a:p>
+            <a:pPr marL="0" indent="0">
+              <a:buNone/>
+            </a:pPr>
+            <a:endParaRPr lang="en-GB" sz="2000" dirty="0" smtClean="0"/>
+          </a:p>
+          <a:p>
+            <a:r>
+              <a:rPr lang="en-GB" sz="2000" dirty="0"/>
+              <a:t>Threads stand for job scheduling. The aim is giving priority for critical tasks</a:t>
+            </a:r>
+            <a:r>
+              <a:rPr lang="en-GB" sz="2000" dirty="0" smtClean="0"/>
+              <a:t>.</a:t>
+            </a:r>
+          </a:p>
+          <a:p>
+            <a:r>
+              <a:rPr lang="en-GB" sz="2000" dirty="0" smtClean="0"/>
+              <a:t>Thread and job mechanism committed in </a:t>
+            </a:r>
+            <a:r>
+              <a:rPr lang="en-GB" sz="2000" b="1" dirty="0" err="1" smtClean="0"/>
+              <a:t>processor.c</a:t>
+            </a:r>
+            <a:r>
+              <a:rPr lang="en-GB" sz="2000" b="1" dirty="0" smtClean="0"/>
+              <a:t>/h</a:t>
+            </a:r>
+            <a:r>
+              <a:rPr lang="en-GB" sz="2000" dirty="0" smtClean="0"/>
+              <a:t> file.</a:t>
+            </a:r>
+            <a:endParaRPr lang="en-GB" sz="2000" dirty="0"/>
+          </a:p>
+        </p:txBody>
+      </p:sp>
+      <p:pic>
+        <p:nvPicPr>
+          <p:cNvPr id="6" name="Resim 5"/>
+          <p:cNvPicPr>
+            <a:picLocks noChangeAspect="1"/>
+          </p:cNvPicPr>
+          <p:nvPr/>
+        </p:nvPicPr>
+        <p:blipFill>
+          <a:blip r:embed="rId2"/>
+          <a:stretch>
+            <a:fillRect/>
+          </a:stretch>
+        </p:blipFill>
+        <p:spPr>
+          <a:xfrm>
+            <a:off x="1364387" y="2295247"/>
+            <a:ext cx="4832227" cy="2455294"/>
+          </a:xfrm>
+          <a:prstGeom prst="rect">
+            <a:avLst/>
+          </a:prstGeom>
+        </p:spPr>
+      </p:pic>
     </p:spTree>
     <p:extLst>
       <p:ext uri="{BB962C8B-B14F-4D97-AF65-F5344CB8AC3E}">
         <p14:creationId xmlns:p14="http://schemas.microsoft.com/office/powerpoint/2010/main" val="1538211446"/>
+      </p:ext>
+    </p:extLst>
+  </p:cSld>
+  <p:clrMapOvr>
+    <a:masterClrMapping/>
+  </p:clrMapOvr>
+</p:sld>
+</file>
+
+<file path=ppt/slides/slide13.xml><?xml version="1.0" encoding="utf-8"?>
+<p:sld xmlns:a="http://schemas.openxmlformats.org/drawingml/2006/main" xmlns:r="http://schemas.openxmlformats.org/officeDocument/2006/relationships" xmlns:p="http://schemas.openxmlformats.org/presentationml/2006/main">
+  <p:cSld>
+    <p:spTree>
+      <p:nvGrpSpPr>
+        <p:cNvPr id="1" name=""/>
+        <p:cNvGrpSpPr/>
+        <p:nvPr/>
+      </p:nvGrpSpPr>
+      <p:grpSpPr>
+        <a:xfrm>
+          <a:off x="0" y="0"/>
+          <a:ext cx="0" cy="0"/>
+          <a:chOff x="0" y="0"/>
+          <a:chExt cx="0" cy="0"/>
+        </a:xfrm>
+      </p:grpSpPr>
+      <p:sp>
+        <p:nvSpPr>
+          <p:cNvPr id="2" name="Unvan 1"/>
+          <p:cNvSpPr>
+            <a:spLocks noGrp="1"/>
+          </p:cNvSpPr>
+          <p:nvPr>
+            <p:ph type="title"/>
+          </p:nvPr>
+        </p:nvSpPr>
+        <p:spPr/>
+        <p:txBody>
+          <a:bodyPr/>
+          <a:lstStyle/>
+          <a:p>
+            <a:r>
+              <a:rPr lang="en-GB" dirty="0" smtClean="0"/>
+              <a:t>Job Management</a:t>
+            </a:r>
+            <a:endParaRPr lang="tr-TR" dirty="0"/>
+          </a:p>
+        </p:txBody>
+      </p:sp>
+      <p:sp>
+        <p:nvSpPr>
+          <p:cNvPr id="3" name="İçerik Yer Tutucusu 2"/>
+          <p:cNvSpPr>
+            <a:spLocks noGrp="1"/>
+          </p:cNvSpPr>
+          <p:nvPr>
+            <p:ph idx="1"/>
+          </p:nvPr>
+        </p:nvSpPr>
+        <p:spPr/>
+        <p:txBody>
+          <a:bodyPr/>
+          <a:lstStyle/>
+          <a:p>
+            <a:pPr marL="0" indent="0">
+              <a:buNone/>
+            </a:pPr>
+            <a:r>
+              <a:rPr lang="en-GB" sz="2000" dirty="0" smtClean="0"/>
+              <a:t>To </a:t>
+            </a:r>
+            <a:r>
+              <a:rPr lang="en-GB" sz="2000" dirty="0"/>
+              <a:t>see jobs and queues</a:t>
+            </a:r>
+            <a:r>
+              <a:rPr lang="en-GB" sz="2000" dirty="0" smtClean="0"/>
+              <a:t>: </a:t>
+            </a:r>
+            <a:r>
+              <a:rPr lang="en-GB" sz="2000" dirty="0" err="1" smtClean="0"/>
+              <a:t>swanctl</a:t>
+            </a:r>
+            <a:r>
+              <a:rPr lang="en-GB" sz="2000" dirty="0" smtClean="0"/>
+              <a:t> --stats</a:t>
+            </a:r>
+          </a:p>
+          <a:p>
+            <a:pPr marL="0" indent="0">
+              <a:buNone/>
+            </a:pPr>
+            <a:endParaRPr lang="en-GB" sz="2000" dirty="0" smtClean="0"/>
+          </a:p>
+          <a:p>
+            <a:pPr marL="0" indent="0">
+              <a:buNone/>
+            </a:pPr>
+            <a:endParaRPr lang="en-GB" sz="2000" dirty="0"/>
+          </a:p>
+          <a:p>
+            <a:pPr marL="0" indent="0">
+              <a:buNone/>
+            </a:pPr>
+            <a:endParaRPr lang="en-GB" sz="2000" dirty="0" smtClean="0"/>
+          </a:p>
+          <a:p>
+            <a:pPr marL="0" indent="0">
+              <a:buNone/>
+            </a:pPr>
+            <a:endParaRPr lang="en-GB" sz="2000" dirty="0"/>
+          </a:p>
+          <a:p>
+            <a:pPr marL="0" indent="0">
+              <a:buNone/>
+            </a:pPr>
+            <a:r>
+              <a:rPr lang="en-GB" sz="2000" dirty="0" smtClean="0"/>
+              <a:t>Priorities </a:t>
+            </a:r>
+            <a:r>
+              <a:rPr lang="en-GB" sz="2000" dirty="0"/>
+              <a:t>are defined in </a:t>
+            </a:r>
+            <a:r>
+              <a:rPr lang="en-GB" sz="2000" dirty="0" err="1" smtClean="0"/>
+              <a:t>enum</a:t>
+            </a:r>
+            <a:r>
+              <a:rPr lang="en-GB" sz="2000" dirty="0" smtClean="0"/>
+              <a:t> of </a:t>
+            </a:r>
+            <a:r>
+              <a:rPr lang="en-GB" sz="2000" b="1" i="1" dirty="0" err="1" smtClean="0"/>
+              <a:t>job_priorit.y_t</a:t>
+            </a:r>
+            <a:r>
+              <a:rPr lang="en-GB" sz="2000" i="1" dirty="0" smtClean="0"/>
+              <a:t> </a:t>
+            </a:r>
+            <a:r>
+              <a:rPr lang="en-GB" sz="2000" dirty="0" smtClean="0"/>
+              <a:t>and </a:t>
+            </a:r>
+            <a:r>
+              <a:rPr lang="en-GB" sz="2000" dirty="0"/>
+              <a:t>structure is </a:t>
+            </a:r>
+            <a:r>
+              <a:rPr lang="en-GB" sz="2000" b="1" i="1" dirty="0" err="1" smtClean="0"/>
+              <a:t>worker_thread_t</a:t>
+            </a:r>
+            <a:r>
+              <a:rPr lang="en-GB" sz="2000" b="1" i="1" dirty="0" smtClean="0"/>
+              <a:t>.</a:t>
+            </a:r>
+          </a:p>
+          <a:p>
+            <a:pPr marL="0" indent="0">
+              <a:buNone/>
+            </a:pPr>
+            <a:r>
+              <a:rPr lang="en-GB" sz="2000" dirty="0" smtClean="0"/>
+              <a:t>Each priority has its own thread that is assigned at the beginning in </a:t>
+            </a:r>
+            <a:r>
+              <a:rPr lang="en-GB" sz="2000" dirty="0"/>
+              <a:t>the function </a:t>
+            </a:r>
+            <a:r>
+              <a:rPr lang="en-GB" sz="2000" b="1" i="1" dirty="0" err="1" smtClean="0"/>
+              <a:t>set_threads</a:t>
+            </a:r>
+            <a:r>
+              <a:rPr lang="en-GB" sz="2000" b="1" i="1" dirty="0" smtClean="0"/>
+              <a:t>.</a:t>
+            </a:r>
+          </a:p>
+          <a:p>
+            <a:pPr marL="0" indent="0">
+              <a:buNone/>
+            </a:pPr>
+            <a:r>
+              <a:rPr lang="en-GB" sz="2000" dirty="0" smtClean="0"/>
+              <a:t>Checking </a:t>
+            </a:r>
+            <a:r>
+              <a:rPr lang="en-GB" sz="2000" i="1" dirty="0" smtClean="0"/>
+              <a:t>liveness</a:t>
+            </a:r>
+            <a:r>
+              <a:rPr lang="en-GB" sz="2000" dirty="0" smtClean="0"/>
+              <a:t> and </a:t>
+            </a:r>
+            <a:r>
+              <a:rPr lang="en-GB" sz="2000" i="1" dirty="0" smtClean="0"/>
+              <a:t>vici</a:t>
+            </a:r>
+            <a:r>
+              <a:rPr lang="en-GB" sz="2000" dirty="0" smtClean="0"/>
+              <a:t> message processing is high priority.</a:t>
+            </a:r>
+          </a:p>
+          <a:p>
+            <a:pPr marL="0" indent="0">
+              <a:buNone/>
+            </a:pPr>
+            <a:r>
+              <a:rPr lang="en-GB" sz="2000" dirty="0" smtClean="0"/>
+              <a:t>IKE_SA_INIT messages are not encrypted and authenticated. They ae open for Dos attacks. Eva can attack by sending continuous IKE_SA_INIT messages. Charon has prevention by limiting half-open count as user configuration</a:t>
+            </a:r>
+            <a:r>
+              <a:rPr lang="en-GB" sz="2000" dirty="0"/>
+              <a:t>. (</a:t>
+            </a:r>
+            <a:r>
+              <a:rPr lang="en-GB" sz="2000" i="1" dirty="0" err="1" smtClean="0"/>
+              <a:t>charon.init_limit_half_open</a:t>
+            </a:r>
+            <a:r>
+              <a:rPr lang="en-GB" sz="2000" dirty="0" smtClean="0"/>
+              <a:t>)</a:t>
+            </a:r>
+          </a:p>
+        </p:txBody>
+      </p:sp>
+      <p:pic>
+        <p:nvPicPr>
+          <p:cNvPr id="6" name="Resim 5"/>
+          <p:cNvPicPr>
+            <a:picLocks noChangeAspect="1"/>
+          </p:cNvPicPr>
+          <p:nvPr/>
+        </p:nvPicPr>
+        <p:blipFill>
+          <a:blip r:embed="rId3"/>
+          <a:stretch>
+            <a:fillRect/>
+          </a:stretch>
+        </p:blipFill>
+        <p:spPr>
+          <a:xfrm>
+            <a:off x="1077897" y="2298946"/>
+            <a:ext cx="4310849" cy="1383901"/>
+          </a:xfrm>
+          <a:prstGeom prst="rect">
+            <a:avLst/>
+          </a:prstGeom>
+        </p:spPr>
+      </p:pic>
+    </p:spTree>
+    <p:extLst>
+      <p:ext uri="{BB962C8B-B14F-4D97-AF65-F5344CB8AC3E}">
+        <p14:creationId xmlns:p14="http://schemas.microsoft.com/office/powerpoint/2010/main" val="2488303025"/>
       </p:ext>
     </p:extLst>
   </p:cSld>
@@ -3851,7 +5650,7 @@
           <a:graphicData uri="http://schemas.openxmlformats.org/presentationml/2006/ole">
             <mc:AlternateContent xmlns:mc="http://schemas.openxmlformats.org/markup-compatibility/2006">
               <mc:Choice xmlns:v="urn:schemas-microsoft-com:vml" Requires="v">
-                <p:oleObj spid="_x0000_s2079" name="Paketleyici Kabuk Nesnesi" showAsIcon="1" r:id="rId4" imgW="1340280" imgH="660960" progId="Package">
+                <p:oleObj spid="_x0000_s2109" name="Paketleyici Kabuk Nesnesi" showAsIcon="1" r:id="rId4" imgW="1340280" imgH="660960" progId="Package">
                   <p:embed/>
                 </p:oleObj>
               </mc:Choice>
@@ -4336,7 +6135,15 @@
           <a:p>
             <a:r>
               <a:rPr lang="en-GB" sz="2000" dirty="0" smtClean="0"/>
-              <a:t>Four ISAKMP(</a:t>
+              <a:t>Four </a:t>
+            </a:r>
+            <a:r>
+              <a:rPr lang="en-GB" sz="2000" b="1" dirty="0" smtClean="0"/>
+              <a:t>ISAKMP</a:t>
+            </a:r>
+            <a:r>
+              <a:rPr lang="en-GB" sz="2000" dirty="0" smtClean="0"/>
+              <a:t>(</a:t>
             </a:r>
             <a:r>
               <a:rPr lang="en-US" sz="2000" b="1" dirty="0" smtClean="0"/>
@@ -4395,12 +6202,16 @@
               <a:t>protocol messages indicates </a:t>
             </a:r>
             <a:r>
-              <a:rPr lang="en-GB" sz="2000" dirty="0" err="1"/>
-              <a:t>ike</a:t>
+              <a:rPr lang="en-GB" sz="2000" b="1" dirty="0" smtClean="0"/>
+              <a:t>IKE</a:t>
+            </a:r>
+            <a:r>
+              <a:rPr lang="en-GB" sz="2000" dirty="0" smtClean="0"/>
+              <a:t> </a:t>
             </a:r>
             <a:r>
               <a:rPr lang="en-GB" sz="2000" dirty="0"/>
-              <a:t> communication</a:t>
+              <a:t>communication</a:t>
             </a:r>
             <a:r>
               <a:rPr lang="en-GB" sz="2000" dirty="0" smtClean="0"/>
@@ -5046,11 +6857,11 @@
             </a:r>
             <a:r>
               <a:rPr lang="en-GB" sz="2000" dirty="0"/>
-              <a:t>messages, rest of all messages are </a:t>
-            </a:r>
-            <a:r>
-              <a:rPr lang="en-GB" sz="2000" dirty="0" err="1"/>
-              <a:t>ancrypted</a:t>
+              <a:t>messages, rest of all messages are e</a:t>
+            </a:r>
+            <a:r>
+              <a:rPr lang="en-GB" sz="2000" dirty="0" smtClean="0"/>
+              <a:t>ncrypted</a:t>
             </a:r>
             <a:r>
               <a:rPr lang="en-GB" sz="2000" dirty="0"/>
@@ -5208,9 +7019,16 @@
           <a:bodyPr/>
           <a:lstStyle/>
           <a:p>
+            <a:endParaRPr lang="en-GB" sz="2000" dirty="0" smtClean="0"/>
+          </a:p>
+          <a:p>
+            <a:r>
+              <a:rPr lang="en-GB" sz="2000" dirty="0" smtClean="0"/>
+              <a:t>Capture </a:t>
+            </a:r>
             <a:r>
               <a:rPr lang="en-GB" sz="2000" dirty="0"/>
-              <a:t>Capture below belong ESP of ICMP message(ping)</a:t>
+              <a:t>below belong ESP of ICMP message(ping)</a:t>
             </a:r>
           </a:p>
           <a:p>
@@ -5246,7 +7064,7 @@
         </p:blipFill>
         <p:spPr>
           <a:xfrm>
-            <a:off x="2965593" y="2539423"/>
+            <a:off x="1975692" y="2858204"/>
             <a:ext cx="3305175" cy="800100"/>
           </a:xfrm>
           <a:prstGeom prst="rect">

</xml_diff>